<commit_message>
Adjustment to java coding and descriptions
</commit_message>
<xml_diff>
--- a/workingFiles/TDD and BDD.pptx
+++ b/workingFiles/TDD and BDD.pptx
@@ -964,7 +964,7 @@
         <a:p>
           <a:r>
             <a:rPr lang="en-US" dirty="0"/>
-            <a:t>Specification Tests</a:t>
+            <a:t>Functional/ Spec. Tests</a:t>
           </a:r>
         </a:p>
       </dgm:t>
@@ -1239,7 +1239,7 @@
         </a:bodyPr>
         <a:lstStyle/>
         <a:p>
-          <a:pPr marL="0" lvl="0" indent="0" algn="ctr" defTabSz="933450">
+          <a:pPr marL="0" lvl="0" indent="0" algn="ctr" defTabSz="1022350">
             <a:lnSpc>
               <a:spcPct val="90000"/>
             </a:lnSpc>
@@ -1252,8 +1252,8 @@
             <a:buNone/>
           </a:pPr>
           <a:r>
-            <a:rPr lang="en-US" sz="2100" kern="1200" dirty="0"/>
-            <a:t>Specification Tests</a:t>
+            <a:rPr lang="en-US" sz="2300" kern="1200" dirty="0"/>
+            <a:t>Functional/ Spec. Tests</a:t>
           </a:r>
         </a:p>
       </dsp:txBody>
@@ -1315,7 +1315,7 @@
         </a:bodyPr>
         <a:lstStyle/>
         <a:p>
-          <a:pPr marL="0" lvl="0" indent="0" algn="ctr" defTabSz="933450">
+          <a:pPr marL="0" lvl="0" indent="0" algn="ctr" defTabSz="1022350">
             <a:lnSpc>
               <a:spcPct val="90000"/>
             </a:lnSpc>
@@ -1328,7 +1328,7 @@
             <a:buNone/>
           </a:pPr>
           <a:r>
-            <a:rPr lang="en-US" sz="2100" kern="1200" dirty="0"/>
+            <a:rPr lang="en-US" sz="2300" kern="1200" dirty="0"/>
             <a:t>Spec. Edge Tests</a:t>
           </a:r>
         </a:p>
@@ -1391,7 +1391,7 @@
         </a:bodyPr>
         <a:lstStyle/>
         <a:p>
-          <a:pPr marL="0" lvl="0" indent="0" algn="ctr" defTabSz="933450">
+          <a:pPr marL="0" lvl="0" indent="0" algn="ctr" defTabSz="1022350">
             <a:lnSpc>
               <a:spcPct val="90000"/>
             </a:lnSpc>
@@ -1404,7 +1404,7 @@
             <a:buNone/>
           </a:pPr>
           <a:r>
-            <a:rPr lang="en-US" sz="2100" kern="1200" dirty="0"/>
+            <a:rPr lang="en-US" sz="2300" kern="1200" dirty="0"/>
             <a:t>Unit/ Design Tests</a:t>
           </a:r>
         </a:p>
@@ -3409,7 +3409,7 @@
           <a:p>
             <a:fld id="{8C472D28-3EAB-456A-AC04-9A10B0123026}" type="datetimeFigureOut">
               <a:rPr lang="en-US" smtClean="0"/>
-              <a:t>7/15/2019</a:t>
+              <a:t>9/15/2019</a:t>
             </a:fld>
             <a:endParaRPr lang="en-US"/>
           </a:p>
@@ -7552,8 +7552,8 @@
           <a:lstStyle/>
           <a:p>
             <a:r>
-              <a:rPr lang="en-US" altLang="en-US"/>
-              <a:t>©2013-2017 Octopus Software LLC</a:t>
+              <a:rPr lang="en-US" altLang="en-US" dirty="0"/>
+              <a:t>©2013-2019 Octopus Software LLC</a:t>
             </a:r>
           </a:p>
         </p:txBody>
@@ -7645,7 +7645,15 @@
             </a:pPr>
             <a:r>
               <a:rPr lang="en-US" sz="2400" dirty="0"/>
-              <a:t>The PO/BA or other SME will work to define each story to bring in “well baked” stories. Imagine the cost per hour of having the entire squad “write” the story if they don’t</a:t>
+              <a:t>The PO/BA or other SME will work to define each story to bring in “</a:t>
+            </a:r>
+            <a:r>
+              <a:rPr lang="en-US" sz="2400" u="sng" dirty="0"/>
+              <a:t>well baked</a:t>
+            </a:r>
+            <a:r>
+              <a:rPr lang="en-US" sz="2400" dirty="0"/>
+              <a:t>” stories. Imagine the cost per hour of having the entire squad “write” the story if they don’t</a:t>
             </a:r>
           </a:p>
           <a:p>
@@ -7655,7 +7663,7 @@
             </a:pPr>
             <a:r>
               <a:rPr lang="en-US" sz="2400" dirty="0"/>
-              <a:t>The meeting continues the ongoing collaboration with the team. The focus should be on Acceptance Criteria and design assumptions to make the desired outcome clear (not just the “how”).</a:t>
+              <a:t>The meeting continues the ongoing collaboration within the team. The focus should be on Acceptance Criteria and design assumptions to make the desired outcome clear (not just the “how”).</a:t>
             </a:r>
           </a:p>
           <a:p>
@@ -7707,10 +7715,9 @@
               <a:defRPr/>
             </a:pPr>
             <a:r>
-              <a:rPr lang="en-US" altLang="en-US"/>
-              <a:t>©2013-2017 Octopus Software LLC</a:t>
-            </a:r>
-            <a:endParaRPr lang="en-US" altLang="en-US" dirty="0"/>
+              <a:rPr lang="en-US" altLang="en-US" dirty="0"/>
+              <a:t>©2013-2019 Octopus Software LLC</a:t>
+            </a:r>
           </a:p>
         </p:txBody>
       </p:sp>
@@ -8020,10 +8027,9 @@
               <a:defRPr/>
             </a:pPr>
             <a:r>
-              <a:rPr lang="en-US" altLang="en-US"/>
-              <a:t>©2013-2017 Octopus Software LLC</a:t>
-            </a:r>
-            <a:endParaRPr lang="en-US" altLang="en-US" dirty="0"/>
+              <a:rPr lang="en-US" altLang="en-US" dirty="0"/>
+              <a:t>©2013-2019 Octopus Software LLC</a:t>
+            </a:r>
           </a:p>
         </p:txBody>
       </p:sp>
@@ -8761,7 +8767,19 @@
             </a:pPr>
             <a:r>
               <a:rPr lang="en-US" sz="1200" dirty="0"/>
-              <a:t>BDD: Refactor the step definition to execute application to fail/</a:t>
+              <a:t>BDD: Refactor the step definition to execute application to </a:t>
+            </a:r>
+            <a:r>
+              <a:rPr lang="en-US" sz="1200" dirty="0">
+                <a:solidFill>
+                  <a:srgbClr val="FF0000"/>
+                </a:solidFill>
+              </a:rPr>
+              <a:t>fail</a:t>
+            </a:r>
+            <a:r>
+              <a:rPr lang="en-US" sz="1200" dirty="0"/>
+              <a:t>/</a:t>
             </a:r>
             <a:r>
               <a:rPr lang="en-US" sz="1200" dirty="0">
@@ -8978,14 +8996,19 @@
             <p:ph type="title"/>
           </p:nvPr>
         </p:nvSpPr>
-        <p:spPr/>
+        <p:spPr>
+          <a:xfrm>
+            <a:off x="26004" y="1"/>
+            <a:ext cx="8218404" cy="980728"/>
+          </a:xfrm>
+        </p:spPr>
         <p:txBody>
           <a:bodyPr/>
           <a:lstStyle/>
           <a:p>
             <a:r>
               <a:rPr lang="en-US" dirty="0"/>
-              <a:t>Where Does AC Come From?</a:t>
+              <a:t>Source of Acceptance Criteria</a:t>
             </a:r>
           </a:p>
         </p:txBody>
@@ -9009,10 +9032,9 @@
               <a:defRPr/>
             </a:pPr>
             <a:r>
-              <a:rPr lang="en-US" altLang="en-US"/>
-              <a:t>©2013-2017 Octopus Software LLC</a:t>
-            </a:r>
-            <a:endParaRPr lang="en-US" altLang="en-US" dirty="0"/>
+              <a:rPr lang="en-US" altLang="en-US" dirty="0"/>
+              <a:t>©2013-2019 Octopus Software LLC</a:t>
+            </a:r>
           </a:p>
         </p:txBody>
       </p:sp>
@@ -9040,7 +9062,7 @@
         </p:blipFill>
         <p:spPr>
           <a:xfrm>
-            <a:off x="72008" y="908720"/>
+            <a:off x="0" y="906786"/>
             <a:ext cx="9144000" cy="5951214"/>
           </a:xfrm>
           <a:prstGeom prst="rect">
@@ -9211,10 +9233,9 @@
               <a:defRPr/>
             </a:pPr>
             <a:r>
-              <a:rPr lang="en-US" altLang="en-US"/>
-              <a:t>©2013-2017 Octopus Software LLC</a:t>
-            </a:r>
-            <a:endParaRPr lang="en-US" altLang="en-US" dirty="0"/>
+              <a:rPr lang="en-US" altLang="en-US" dirty="0"/>
+              <a:t>©2013-2019 Octopus Software LLC</a:t>
+            </a:r>
           </a:p>
         </p:txBody>
       </p:sp>
@@ -9701,7 +9722,7 @@
             </a:pPr>
             <a:r>
               <a:rPr lang="en-US" sz="2400" dirty="0"/>
-              <a:t>Lets use a Roman Numeral conversion:</a:t>
+              <a:t>Lets use a Roman Numeral &lt;&gt; Arabic conversion:</a:t>
             </a:r>
           </a:p>
           <a:p>
@@ -9881,10 +9902,9 @@
               <a:defRPr/>
             </a:pPr>
             <a:r>
-              <a:rPr lang="en-US" altLang="en-US"/>
-              <a:t>©2013-2017 Octopus Software LLC</a:t>
-            </a:r>
-            <a:endParaRPr lang="en-US" altLang="en-US" dirty="0"/>
+              <a:rPr lang="en-US" altLang="en-US" dirty="0"/>
+              <a:t>©2013-2019 Octopus Software LLC</a:t>
+            </a:r>
           </a:p>
         </p:txBody>
       </p:sp>
@@ -10671,10 +10691,9 @@
               <a:defRPr/>
             </a:pPr>
             <a:r>
-              <a:rPr lang="en-US" altLang="en-US"/>
-              <a:t>©2013-2017 Octopus Software LLC</a:t>
-            </a:r>
-            <a:endParaRPr lang="en-US" altLang="en-US" dirty="0"/>
+              <a:rPr lang="en-US" altLang="en-US" dirty="0"/>
+              <a:t>©2013-2019 Octopus Software LLC</a:t>
+            </a:r>
           </a:p>
         </p:txBody>
       </p:sp>
@@ -11537,10 +11556,9 @@
               <a:defRPr/>
             </a:pPr>
             <a:r>
-              <a:rPr lang="en-US" altLang="en-US"/>
-              <a:t>©2013-2017 Octopus Software LLC</a:t>
-            </a:r>
-            <a:endParaRPr lang="en-US" altLang="en-US" dirty="0"/>
+              <a:rPr lang="en-US" altLang="en-US" dirty="0"/>
+              <a:t>©2013-2019 Octopus Software LLC</a:t>
+            </a:r>
           </a:p>
         </p:txBody>
       </p:sp>
@@ -11699,10 +11717,9 @@
               <a:defRPr/>
             </a:pPr>
             <a:r>
-              <a:rPr lang="en-US" altLang="en-US"/>
-              <a:t>©2013-2017 Octopus Software LLC</a:t>
-            </a:r>
-            <a:endParaRPr lang="en-US" altLang="en-US" dirty="0"/>
+              <a:rPr lang="en-US" altLang="en-US" dirty="0"/>
+              <a:t>©2013-2019 Octopus Software LLC</a:t>
+            </a:r>
           </a:p>
         </p:txBody>
       </p:sp>
@@ -11794,7 +11811,7 @@
         </p:nvGrpSpPr>
         <p:grpSpPr>
           <a:xfrm>
-            <a:off x="1524166" y="3140968"/>
+            <a:off x="2492073" y="936879"/>
             <a:ext cx="1445576" cy="1879249"/>
             <a:chOff x="3943060" y="687028"/>
             <a:chExt cx="1445576" cy="1879249"/>
@@ -11874,7 +11891,7 @@
         </p:nvGrpSpPr>
         <p:grpSpPr>
           <a:xfrm>
-            <a:off x="4127685" y="3320669"/>
+            <a:off x="2467284" y="3144739"/>
             <a:ext cx="1445576" cy="1879249"/>
             <a:chOff x="3943060" y="687028"/>
             <a:chExt cx="1445576" cy="1879249"/>
@@ -11954,7 +11971,7 @@
         </p:nvGrpSpPr>
         <p:grpSpPr>
           <a:xfrm>
-            <a:off x="2987824" y="980729"/>
+            <a:off x="479814" y="3140968"/>
             <a:ext cx="1445576" cy="1879249"/>
             <a:chOff x="3943060" y="687028"/>
             <a:chExt cx="1445576" cy="1879249"/>
@@ -12424,6 +12441,16 @@
             </a:r>
           </a:p>
           <a:p>
+            <a:pPr indent="-457200">
+              <a:buFont typeface="Arial"/>
+              <a:buChar char="•"/>
+            </a:pPr>
+            <a:r>
+              <a:rPr lang="en-US" sz="2600" dirty="0"/>
+              <a:t>Let’s start coding!</a:t>
+            </a:r>
+          </a:p>
+          <a:p>
             <a:pPr marL="0" indent="0">
               <a:buNone/>
             </a:pPr>
@@ -12455,10 +12482,9 @@
               <a:defRPr/>
             </a:pPr>
             <a:r>
-              <a:rPr lang="en-US" altLang="en-US"/>
-              <a:t>©2013-2017 Octopus Software LLC</a:t>
-            </a:r>
-            <a:endParaRPr lang="en-US" altLang="en-US" dirty="0"/>
+              <a:rPr lang="en-US" altLang="en-US" dirty="0"/>
+              <a:t>©2013-2019 Octopus Software LLC</a:t>
+            </a:r>
           </a:p>
         </p:txBody>
       </p:sp>
@@ -12628,10 +12654,9 @@
               <a:defRPr/>
             </a:pPr>
             <a:r>
-              <a:rPr lang="en-US" altLang="en-US"/>
-              <a:t>©2013-2017 Octopus Software LLC</a:t>
-            </a:r>
-            <a:endParaRPr lang="en-US" altLang="en-US" dirty="0"/>
+              <a:rPr lang="en-US" altLang="en-US" dirty="0"/>
+              <a:t>©2013-2019 Octopus Software LLC</a:t>
+            </a:r>
           </a:p>
         </p:txBody>
       </p:sp>
@@ -12930,10 +12955,9 @@
               <a:defRPr/>
             </a:pPr>
             <a:r>
-              <a:rPr lang="en-US" altLang="en-US"/>
-              <a:t>©2013-2017 Octopus Software LLC</a:t>
-            </a:r>
-            <a:endParaRPr lang="en-US" altLang="en-US" dirty="0"/>
+              <a:rPr lang="en-US" altLang="en-US" dirty="0"/>
+              <a:t>©2013-2019 Octopus Software LLC</a:t>
+            </a:r>
           </a:p>
         </p:txBody>
       </p:sp>
@@ -16586,10 +16610,9 @@
               <a:defRPr/>
             </a:pPr>
             <a:r>
-              <a:rPr lang="en-US" altLang="en-US"/>
-              <a:t>©2013-2017 Octopus Software LLC</a:t>
-            </a:r>
-            <a:endParaRPr lang="en-US" altLang="en-US" dirty="0"/>
+              <a:rPr lang="en-US" altLang="en-US" dirty="0"/>
+              <a:t>©2013-2019 Octopus Software LLC</a:t>
+            </a:r>
           </a:p>
         </p:txBody>
       </p:sp>
@@ -17212,10 +17235,9 @@
               <a:defRPr/>
             </a:pPr>
             <a:r>
-              <a:rPr lang="en-US" altLang="en-US"/>
-              <a:t>©2013-2017 Octopus Software LLC</a:t>
-            </a:r>
-            <a:endParaRPr lang="en-US" altLang="en-US" dirty="0"/>
+              <a:rPr lang="en-US" altLang="en-US" dirty="0"/>
+              <a:t>©2013-2019 Octopus Software LLC</a:t>
+            </a:r>
           </a:p>
         </p:txBody>
       </p:sp>
@@ -17972,10 +17994,9 @@
               <a:defRPr/>
             </a:pPr>
             <a:r>
-              <a:rPr lang="en-US" altLang="en-US"/>
-              <a:t>©2013-2017 Octopus Software LLC</a:t>
-            </a:r>
-            <a:endParaRPr lang="en-US" altLang="en-US" dirty="0"/>
+              <a:rPr lang="en-US" altLang="en-US" dirty="0"/>
+              <a:t>©2013-2019 Octopus Software LLC</a:t>
+            </a:r>
           </a:p>
         </p:txBody>
       </p:sp>
@@ -33033,8 +33054,8 @@
               <a:defRPr/>
             </a:pPr>
             <a:r>
-              <a:rPr lang="en-US" altLang="en-US"/>
-              <a:t>©2013-2017 Octopus Software LLC</a:t>
+              <a:rPr lang="en-US" altLang="en-US" dirty="0"/>
+              <a:t>©2013-2019 Octopus Software LLC</a:t>
             </a:r>
           </a:p>
         </p:txBody>
@@ -33196,10 +33217,9 @@
               <a:defRPr/>
             </a:pPr>
             <a:r>
-              <a:rPr lang="en-US" altLang="en-US"/>
-              <a:t>©2013-2017 Octopus Software LLC</a:t>
-            </a:r>
-            <a:endParaRPr lang="en-US" altLang="en-US" dirty="0"/>
+              <a:rPr lang="en-US" altLang="en-US" dirty="0"/>
+              <a:t>©2013-2019 Octopus Software LLC</a:t>
+            </a:r>
           </a:p>
         </p:txBody>
       </p:sp>
@@ -33245,7 +33265,7 @@
             </a:pPr>
             <a:r>
               <a:rPr lang="en-US" sz="2000" dirty="0"/>
-              <a:t>Approach?</a:t>
+              <a:t>Approach</a:t>
             </a:r>
           </a:p>
           <a:p>
@@ -33255,7 +33275,7 @@
             </a:pPr>
             <a:r>
               <a:rPr lang="en-US" sz="2000" dirty="0"/>
-              <a:t>Impact on daily work?</a:t>
+              <a:t>Impact on daily work</a:t>
             </a:r>
           </a:p>
           <a:p>
@@ -33295,7 +33315,7 @@
             </a:pPr>
             <a:r>
               <a:rPr lang="en-US" sz="2000" dirty="0"/>
-              <a:t>Impact on processes and tooling?</a:t>
+              <a:t>Impact on processes and tooling</a:t>
             </a:r>
           </a:p>
           <a:p>
@@ -33305,7 +33325,7 @@
             </a:pPr>
             <a:r>
               <a:rPr lang="en-US" sz="2000" dirty="0"/>
-              <a:t>Training and support needed?</a:t>
+              <a:t>Training and support needed</a:t>
             </a:r>
           </a:p>
           <a:p>
@@ -33315,7 +33335,7 @@
             </a:pPr>
             <a:r>
               <a:rPr lang="en-US" sz="2000" dirty="0"/>
-              <a:t>Costs and benefits?</a:t>
+              <a:t>Costs and benefits</a:t>
             </a:r>
           </a:p>
         </p:txBody>
@@ -33488,10 +33508,9 @@
               <a:defRPr/>
             </a:pPr>
             <a:r>
-              <a:rPr lang="en-US" altLang="en-US"/>
-              <a:t>©2013-2017 Octopus Software LLC</a:t>
-            </a:r>
-            <a:endParaRPr lang="en-US" altLang="en-US" dirty="0"/>
+              <a:rPr lang="en-US" altLang="en-US" dirty="0"/>
+              <a:t>©2013-2019 Octopus Software LLC</a:t>
+            </a:r>
           </a:p>
         </p:txBody>
       </p:sp>
@@ -33932,21 +33951,35 @@
           <a:p>
             <a:r>
               <a:rPr lang="en-US" sz="2400" dirty="0"/>
-              <a:t>Collaborating on business specifications with examples to improve communication about story intent, preserve that information and make it quickly “</a:t>
-            </a:r>
-            <a:r>
-              <a:rPr lang="en-US" sz="2400" dirty="0" err="1"/>
+              <a:t>Collaborating on business specifications</a:t>
+            </a:r>
+          </a:p>
+          <a:p>
+            <a:pPr lvl="1"/>
+            <a:r>
+              <a:rPr lang="en-US" sz="2000" dirty="0"/>
+              <a:t>Using examples to improve communication about story intent, </a:t>
+            </a:r>
+          </a:p>
+          <a:p>
+            <a:pPr lvl="1"/>
+            <a:r>
+              <a:rPr lang="en-US" sz="2000" dirty="0"/>
+              <a:t>Preserve that information and make it quickly &amp; sustainably “</a:t>
+            </a:r>
+            <a:r>
+              <a:rPr lang="en-US" sz="2000" dirty="0" err="1"/>
               <a:t>proveable</a:t>
             </a:r>
             <a:r>
+              <a:rPr lang="en-US" sz="2000" dirty="0"/>
+              <a:t>”</a:t>
+            </a:r>
+          </a:p>
+          <a:p>
+            <a:r>
               <a:rPr lang="en-US" sz="2400" dirty="0"/>
-              <a:t>”</a:t>
-            </a:r>
-          </a:p>
-          <a:p>
-            <a:r>
-              <a:rPr lang="en-US" sz="2400" dirty="0"/>
-              <a:t>AKA Acceptance Test Driven Development or Specification by Example</a:t>
+              <a:t>AKA “Acceptance Test Driven Development” or “Specification by Example”</a:t>
             </a:r>
           </a:p>
           <a:p>
@@ -34000,10 +34033,9 @@
               <a:defRPr/>
             </a:pPr>
             <a:r>
-              <a:rPr lang="en-US" altLang="en-US"/>
-              <a:t>©2013-2017 Octopus Software LLC</a:t>
-            </a:r>
-            <a:endParaRPr lang="en-US" altLang="en-US" dirty="0"/>
+              <a:rPr lang="en-US" altLang="en-US" dirty="0"/>
+              <a:t>©2013-2019 Octopus Software LLC</a:t>
+            </a:r>
           </a:p>
         </p:txBody>
       </p:sp>
@@ -34053,7 +34085,7 @@
                                         <p:tgtEl>
                                           <p:spTgt spid="3">
                                             <p:txEl>
-                                              <p:pRg st="3" end="3"/>
+                                              <p:pRg st="5" end="5"/>
                                             </p:txEl>
                                           </p:spTgt>
                                         </p:tgtEl>
@@ -34084,7 +34116,7 @@
                                         <p:tgtEl>
                                           <p:spTgt spid="3">
                                             <p:txEl>
-                                              <p:pRg st="4" end="4"/>
+                                              <p:pRg st="6" end="6"/>
                                             </p:txEl>
                                           </p:spTgt>
                                         </p:tgtEl>
@@ -34195,7 +34227,7 @@
           <p:nvPr>
             <p:extLst>
               <p:ext uri="{D42A27DB-BD31-4B8C-83A1-F6EECF244321}">
-                <p14:modId xmlns:p14="http://schemas.microsoft.com/office/powerpoint/2010/main" val="263517552"/>
+                <p14:modId xmlns:p14="http://schemas.microsoft.com/office/powerpoint/2010/main" val="754875164"/>
               </p:ext>
             </p:extLst>
           </p:nvPr>
@@ -35165,7 +35197,7 @@
         </p:nvSpPr>
         <p:spPr>
           <a:xfrm>
-            <a:off x="3131840" y="6619826"/>
+            <a:off x="3207189" y="6592362"/>
             <a:ext cx="3024336" cy="193550"/>
           </a:xfrm>
         </p:spPr>
@@ -35177,8 +35209,8 @@
               <a:defRPr/>
             </a:pPr>
             <a:r>
-              <a:rPr lang="en-US" altLang="en-US"/>
-              <a:t>©2013-2017 Octopus Software LLC</a:t>
+              <a:rPr lang="en-US" altLang="en-US" dirty="0"/>
+              <a:t>©2013-2019 Octopus Software LLC</a:t>
             </a:r>
           </a:p>
         </p:txBody>
@@ -36653,7 +36685,7 @@
             </a:pPr>
             <a:r>
               <a:rPr lang="en-US" sz="2800" dirty="0"/>
-              <a:t>There is a simple, very short cycle to this:</a:t>
+              <a:t>A simple, very short cycle to:</a:t>
             </a:r>
           </a:p>
           <a:p>
@@ -36709,7 +36741,7 @@
             </a:pPr>
             <a:r>
               <a:rPr lang="en-US" sz="2800" dirty="0"/>
-              <a:t>Write code to get it to </a:t>
+              <a:t>Write code (implement design) to get it to </a:t>
             </a:r>
             <a:r>
               <a:rPr lang="en-US" sz="2800" dirty="0">
@@ -36762,10 +36794,9 @@
               <a:defRPr/>
             </a:pPr>
             <a:r>
-              <a:rPr lang="en-US" altLang="en-US"/>
-              <a:t>©2013-2017 Octopus Software LLC</a:t>
-            </a:r>
-            <a:endParaRPr lang="en-US" altLang="en-US" dirty="0"/>
+              <a:rPr lang="en-US" altLang="en-US" dirty="0"/>
+              <a:t>©2013-2019 Octopus Software LLC</a:t>
+            </a:r>
           </a:p>
         </p:txBody>
       </p:sp>
@@ -38100,10 +38131,9 @@
               <a:defRPr/>
             </a:pPr>
             <a:r>
-              <a:rPr lang="en-US" altLang="en-US"/>
-              <a:t>©2013-2017 Octopus Software LLC</a:t>
-            </a:r>
-            <a:endParaRPr lang="en-US" altLang="en-US" dirty="0"/>
+              <a:rPr lang="en-US" altLang="en-US" dirty="0"/>
+              <a:t>©2013-2019 Octopus Software LLC</a:t>
+            </a:r>
           </a:p>
         </p:txBody>
       </p:sp>
@@ -38725,10 +38755,9 @@
               <a:defRPr/>
             </a:pPr>
             <a:r>
-              <a:rPr lang="en-US" altLang="en-US"/>
-              <a:t>©2013-2017 Octopus Software LLC</a:t>
-            </a:r>
-            <a:endParaRPr lang="en-US" altLang="en-US" dirty="0"/>
+              <a:rPr lang="en-US" altLang="en-US" dirty="0"/>
+              <a:t>©2013-2019 Octopus Software LLC</a:t>
+            </a:r>
           </a:p>
         </p:txBody>
       </p:sp>

</xml_diff>

<commit_message>
Added slide showing difference between design and intent testing
</commit_message>
<xml_diff>
--- a/workingFiles/TDD and BDD.pptx
+++ b/workingFiles/TDD and BDD.pptx
@@ -5,7 +5,7 @@
     <p:sldMasterId id="2147483648" r:id="rId1"/>
   </p:sldMasterIdLst>
   <p:notesMasterIdLst>
-    <p:notesMasterId r:id="rId31"/>
+    <p:notesMasterId r:id="rId32"/>
   </p:notesMasterIdLst>
   <p:sldIdLst>
     <p:sldId id="256" r:id="rId2"/>
@@ -27,16 +27,17 @@
     <p:sldId id="305" r:id="rId18"/>
     <p:sldId id="269" r:id="rId19"/>
     <p:sldId id="281" r:id="rId20"/>
-    <p:sldId id="282" r:id="rId21"/>
-    <p:sldId id="286" r:id="rId22"/>
-    <p:sldId id="296" r:id="rId23"/>
-    <p:sldId id="307" r:id="rId24"/>
-    <p:sldId id="260" r:id="rId25"/>
-    <p:sldId id="308" r:id="rId26"/>
-    <p:sldId id="262" r:id="rId27"/>
-    <p:sldId id="263" r:id="rId28"/>
-    <p:sldId id="297" r:id="rId29"/>
-    <p:sldId id="300" r:id="rId30"/>
+    <p:sldId id="1261" r:id="rId21"/>
+    <p:sldId id="282" r:id="rId22"/>
+    <p:sldId id="286" r:id="rId23"/>
+    <p:sldId id="296" r:id="rId24"/>
+    <p:sldId id="307" r:id="rId25"/>
+    <p:sldId id="260" r:id="rId26"/>
+    <p:sldId id="308" r:id="rId27"/>
+    <p:sldId id="262" r:id="rId28"/>
+    <p:sldId id="263" r:id="rId29"/>
+    <p:sldId id="297" r:id="rId30"/>
+    <p:sldId id="300" r:id="rId31"/>
   </p:sldIdLst>
   <p:sldSz cx="9144000" cy="6858000" type="screen4x3"/>
   <p:notesSz cx="6858000" cy="9144000"/>
@@ -3409,7 +3410,7 @@
           <a:p>
             <a:fld id="{8C472D28-3EAB-456A-AC04-9A10B0123026}" type="datetimeFigureOut">
               <a:rPr lang="en-US" smtClean="0"/>
-              <a:t>9/15/2019</a:t>
+              <a:t>10/24/2019</a:t>
             </a:fld>
             <a:endParaRPr lang="en-US"/>
           </a:p>
@@ -3806,13 +3807,8 @@
           <a:p>
             <a:r>
               <a:rPr lang="en-US" dirty="0"/>
-              <a:t>All of our</a:t>
-            </a:r>
-            <a:r>
-              <a:rPr lang="en-US" baseline="0" dirty="0"/>
-              <a:t> functional tests pass. Are we missing anything? Not much, as the code coverage from our functional testing is at 90%</a:t>
-            </a:r>
-            <a:endParaRPr lang="en-US" dirty="0"/>
+              <a:t>2600 pounds of the Bobcat exceed the capacity of the top two “trucks”</a:t>
+            </a:r>
           </a:p>
         </p:txBody>
       </p:sp>
@@ -3823,7 +3819,7 @@
             <a:spLocks noGrp="1"/>
           </p:cNvSpPr>
           <p:nvPr>
-            <p:ph type="sldNum" sz="quarter" idx="10"/>
+            <p:ph type="sldNum" sz="quarter" idx="5"/>
           </p:nvPr>
         </p:nvSpPr>
         <p:spPr/>
@@ -3831,7 +3827,7 @@
           <a:bodyPr/>
           <a:lstStyle/>
           <a:p>
-            <a:fld id="{824F1824-D3A0-4110-8B16-E4747C24BC49}" type="slidenum">
+            <a:fld id="{85CB1E7E-0786-4155-9F97-16AAFC5C7DCB}" type="slidenum">
               <a:rPr lang="en-US" smtClean="0"/>
               <a:t>20</a:t>
             </a:fld>
@@ -3842,7 +3838,7 @@
     </p:spTree>
     <p:extLst>
       <p:ext uri="{BB962C8B-B14F-4D97-AF65-F5344CB8AC3E}">
-        <p14:creationId xmlns:p14="http://schemas.microsoft.com/office/powerpoint/2010/main" val="2743347538"/>
+        <p14:creationId xmlns:p14="http://schemas.microsoft.com/office/powerpoint/2010/main" val="2052465298"/>
       </p:ext>
     </p:extLst>
   </p:cSld>
@@ -3896,6 +3892,14 @@
           <a:bodyPr/>
           <a:lstStyle/>
           <a:p>
+            <a:r>
+              <a:rPr lang="en-US" dirty="0"/>
+              <a:t>All of our</a:t>
+            </a:r>
+            <a:r>
+              <a:rPr lang="en-US" baseline="0" dirty="0"/>
+              <a:t> functional tests pass. Are we missing anything? Not much, as the code coverage from our functional testing is at 90%</a:t>
+            </a:r>
             <a:endParaRPr lang="en-US" dirty="0"/>
           </a:p>
         </p:txBody>
@@ -3915,9 +3919,93 @@
           <a:bodyPr/>
           <a:lstStyle/>
           <a:p>
+            <a:fld id="{824F1824-D3A0-4110-8B16-E4747C24BC49}" type="slidenum">
+              <a:rPr lang="en-US" smtClean="0"/>
+              <a:t>21</a:t>
+            </a:fld>
+            <a:endParaRPr lang="en-US"/>
+          </a:p>
+        </p:txBody>
+      </p:sp>
+    </p:spTree>
+    <p:extLst>
+      <p:ext uri="{BB962C8B-B14F-4D97-AF65-F5344CB8AC3E}">
+        <p14:creationId xmlns:p14="http://schemas.microsoft.com/office/powerpoint/2010/main" val="2743347538"/>
+      </p:ext>
+    </p:extLst>
+  </p:cSld>
+  <p:clrMapOvr>
+    <a:masterClrMapping/>
+  </p:clrMapOvr>
+</p:notes>
+</file>
+
+<file path=ppt/notesSlides/notesSlide12.xml><?xml version="1.0" encoding="utf-8"?>
+<p:notes xmlns:a="http://schemas.openxmlformats.org/drawingml/2006/main" xmlns:r="http://schemas.openxmlformats.org/officeDocument/2006/relationships" xmlns:p="http://schemas.openxmlformats.org/presentationml/2006/main">
+  <p:cSld>
+    <p:spTree>
+      <p:nvGrpSpPr>
+        <p:cNvPr id="1" name=""/>
+        <p:cNvGrpSpPr/>
+        <p:nvPr/>
+      </p:nvGrpSpPr>
+      <p:grpSpPr>
+        <a:xfrm>
+          <a:off x="0" y="0"/>
+          <a:ext cx="0" cy="0"/>
+          <a:chOff x="0" y="0"/>
+          <a:chExt cx="0" cy="0"/>
+        </a:xfrm>
+      </p:grpSpPr>
+      <p:sp>
+        <p:nvSpPr>
+          <p:cNvPr id="2" name="Slide Image Placeholder 1"/>
+          <p:cNvSpPr>
+            <a:spLocks noGrp="1" noRot="1" noChangeAspect="1"/>
+          </p:cNvSpPr>
+          <p:nvPr>
+            <p:ph type="sldImg"/>
+          </p:nvPr>
+        </p:nvSpPr>
+        <p:spPr/>
+      </p:sp>
+      <p:sp>
+        <p:nvSpPr>
+          <p:cNvPr id="3" name="Notes Placeholder 2"/>
+          <p:cNvSpPr>
+            <a:spLocks noGrp="1"/>
+          </p:cNvSpPr>
+          <p:nvPr>
+            <p:ph type="body" idx="1"/>
+          </p:nvPr>
+        </p:nvSpPr>
+        <p:spPr/>
+        <p:txBody>
+          <a:bodyPr/>
+          <a:lstStyle/>
+          <a:p>
+            <a:endParaRPr lang="en-US" dirty="0"/>
+          </a:p>
+        </p:txBody>
+      </p:sp>
+      <p:sp>
+        <p:nvSpPr>
+          <p:cNvPr id="4" name="Slide Number Placeholder 3"/>
+          <p:cNvSpPr>
+            <a:spLocks noGrp="1"/>
+          </p:cNvSpPr>
+          <p:nvPr>
+            <p:ph type="sldNum" sz="quarter" idx="10"/>
+          </p:nvPr>
+        </p:nvSpPr>
+        <p:spPr/>
+        <p:txBody>
+          <a:bodyPr/>
+          <a:lstStyle/>
+          <a:p>
             <a:fld id="{B9529A1B-38F8-4E57-9C7F-24B500070D8B}" type="slidenum">
               <a:rPr lang="en-US" smtClean="0"/>
-              <a:t>23</a:t>
+              <a:t>24</a:t>
             </a:fld>
             <a:endParaRPr lang="en-US"/>
           </a:p>
@@ -12993,6 +13081,881 @@
       </p:grpSpPr>
       <p:sp>
         <p:nvSpPr>
+          <p:cNvPr id="2" name="Title 1">
+            <a:extLst>
+              <a:ext uri="{FF2B5EF4-FFF2-40B4-BE49-F238E27FC236}">
+                <a16:creationId xmlns:a16="http://schemas.microsoft.com/office/drawing/2014/main" id="{C6A5D242-46BF-4320-872B-B79BF06F1421}"/>
+              </a:ext>
+            </a:extLst>
+          </p:cNvPr>
+          <p:cNvSpPr>
+            <a:spLocks noGrp="1"/>
+          </p:cNvSpPr>
+          <p:nvPr>
+            <p:ph type="title"/>
+          </p:nvPr>
+        </p:nvSpPr>
+        <p:spPr>
+          <a:xfrm>
+            <a:off x="-324544" y="168111"/>
+            <a:ext cx="8640960" cy="422672"/>
+          </a:xfrm>
+        </p:spPr>
+        <p:txBody>
+          <a:bodyPr>
+            <a:normAutofit fontScale="90000"/>
+          </a:bodyPr>
+          <a:lstStyle/>
+          <a:p>
+            <a:r>
+              <a:rPr lang="en-US" dirty="0"/>
+              <a:t>What Do We Mean Validating Design?</a:t>
+            </a:r>
+          </a:p>
+        </p:txBody>
+      </p:sp>
+      <p:pic>
+        <p:nvPicPr>
+          <p:cNvPr id="1028" name="Picture 4" descr="Image result for ford f150">
+            <a:extLst>
+              <a:ext uri="{FF2B5EF4-FFF2-40B4-BE49-F238E27FC236}">
+                <a16:creationId xmlns:a16="http://schemas.microsoft.com/office/drawing/2014/main" id="{3BF3519F-550E-4BD8-89A6-B858AC8C62C0}"/>
+              </a:ext>
+            </a:extLst>
+          </p:cNvPr>
+          <p:cNvPicPr>
+            <a:picLocks noChangeAspect="1" noChangeArrowheads="1"/>
+          </p:cNvPicPr>
+          <p:nvPr/>
+        </p:nvPicPr>
+        <p:blipFill>
+          <a:blip r:embed="rId3">
+            <a:extLst>
+              <a:ext uri="{28A0092B-C50C-407E-A947-70E740481C1C}">
+                <a14:useLocalDpi xmlns:a14="http://schemas.microsoft.com/office/drawing/2010/main" val="0"/>
+              </a:ext>
+            </a:extLst>
+          </a:blip>
+          <a:srcRect/>
+          <a:stretch>
+            <a:fillRect/>
+          </a:stretch>
+        </p:blipFill>
+        <p:spPr bwMode="auto">
+          <a:xfrm>
+            <a:off x="6412497" y="3143251"/>
+            <a:ext cx="2738519" cy="1822360"/>
+          </a:xfrm>
+          <a:prstGeom prst="rect">
+            <a:avLst/>
+          </a:prstGeom>
+          <a:noFill/>
+          <a:extLst>
+            <a:ext uri="{909E8E84-426E-40DD-AFC4-6F175D3DCCD1}">
+              <a14:hiddenFill xmlns:a14="http://schemas.microsoft.com/office/drawing/2010/main">
+                <a:solidFill>
+                  <a:srgbClr val="FFFFFF"/>
+                </a:solidFill>
+              </a14:hiddenFill>
+            </a:ext>
+          </a:extLst>
+        </p:spPr>
+      </p:pic>
+      <p:pic>
+        <p:nvPicPr>
+          <p:cNvPr id="6" name="Picture 5" descr="A truck parked on the side of a road&#10;&#10;Description automatically generated">
+            <a:extLst>
+              <a:ext uri="{FF2B5EF4-FFF2-40B4-BE49-F238E27FC236}">
+                <a16:creationId xmlns:a16="http://schemas.microsoft.com/office/drawing/2014/main" id="{5F60B972-B1AA-47B8-B569-B94D19365F13}"/>
+              </a:ext>
+            </a:extLst>
+          </p:cNvPr>
+          <p:cNvPicPr>
+            <a:picLocks noChangeAspect="1"/>
+          </p:cNvPicPr>
+          <p:nvPr/>
+        </p:nvPicPr>
+        <p:blipFill>
+          <a:blip r:embed="rId4">
+            <a:extLst>
+              <a:ext uri="{28A0092B-C50C-407E-A947-70E740481C1C}">
+                <a14:useLocalDpi xmlns:a14="http://schemas.microsoft.com/office/drawing/2010/main" val="0"/>
+              </a:ext>
+            </a:extLst>
+          </a:blip>
+          <a:stretch>
+            <a:fillRect/>
+          </a:stretch>
+        </p:blipFill>
+        <p:spPr>
+          <a:xfrm>
+            <a:off x="6608762" y="4749891"/>
+            <a:ext cx="2571750" cy="1244377"/>
+          </a:xfrm>
+          <a:prstGeom prst="rect">
+            <a:avLst/>
+          </a:prstGeom>
+        </p:spPr>
+      </p:pic>
+      <p:sp>
+        <p:nvSpPr>
+          <p:cNvPr id="7" name="TextBox 6">
+            <a:extLst>
+              <a:ext uri="{FF2B5EF4-FFF2-40B4-BE49-F238E27FC236}">
+                <a16:creationId xmlns:a16="http://schemas.microsoft.com/office/drawing/2014/main" id="{6B818CE8-9A84-4B2F-B1FD-B9D6033C7980}"/>
+              </a:ext>
+            </a:extLst>
+          </p:cNvPr>
+          <p:cNvSpPr txBox="1"/>
+          <p:nvPr/>
+        </p:nvSpPr>
+        <p:spPr>
+          <a:xfrm>
+            <a:off x="286167" y="1493915"/>
+            <a:ext cx="5261697" cy="2631490"/>
+          </a:xfrm>
+          <a:prstGeom prst="rect">
+            <a:avLst/>
+          </a:prstGeom>
+          <a:noFill/>
+        </p:spPr>
+        <p:txBody>
+          <a:bodyPr wrap="none" rtlCol="0">
+            <a:spAutoFit/>
+          </a:bodyPr>
+          <a:lstStyle/>
+          <a:p>
+            <a:r>
+              <a:rPr lang="en-US" sz="2100" dirty="0"/>
+              <a:t>Design items like:</a:t>
+            </a:r>
+          </a:p>
+          <a:p>
+            <a:pPr marL="214313" indent="-214313">
+              <a:buFont typeface="Arial" panose="020B0604020202020204" pitchFamily="34" charset="0"/>
+              <a:buChar char="•"/>
+            </a:pPr>
+            <a:r>
+              <a:rPr lang="en-US" dirty="0"/>
+              <a:t>Can the vehicle carry freight?</a:t>
+            </a:r>
+          </a:p>
+          <a:p>
+            <a:pPr marL="214313" indent="-214313">
+              <a:buFont typeface="Arial" panose="020B0604020202020204" pitchFamily="34" charset="0"/>
+              <a:buChar char="•"/>
+            </a:pPr>
+            <a:r>
+              <a:rPr lang="en-US" dirty="0"/>
+              <a:t>Can it drive on the highway?</a:t>
+            </a:r>
+          </a:p>
+          <a:p>
+            <a:pPr marL="214313" indent="-214313">
+              <a:buFont typeface="Arial" panose="020B0604020202020204" pitchFamily="34" charset="0"/>
+              <a:buChar char="•"/>
+            </a:pPr>
+            <a:r>
+              <a:rPr lang="en-US" dirty="0"/>
+              <a:t>Can we monitor tire pressure?</a:t>
+            </a:r>
+          </a:p>
+          <a:p>
+            <a:pPr marL="214313" indent="-214313">
+              <a:buFont typeface="Arial" panose="020B0604020202020204" pitchFamily="34" charset="0"/>
+              <a:buChar char="•"/>
+            </a:pPr>
+            <a:r>
+              <a:rPr lang="en-US" dirty="0"/>
+              <a:t>Is the driver protected from the environment?</a:t>
+            </a:r>
+          </a:p>
+          <a:p>
+            <a:pPr marL="214313" indent="-214313">
+              <a:buFont typeface="Arial" panose="020B0604020202020204" pitchFamily="34" charset="0"/>
+              <a:buChar char="•"/>
+            </a:pPr>
+            <a:r>
+              <a:rPr lang="en-US" dirty="0"/>
+              <a:t>Does the engine start?</a:t>
+            </a:r>
+          </a:p>
+          <a:p>
+            <a:pPr marL="214313" indent="-214313">
+              <a:buFont typeface="Arial" panose="020B0604020202020204" pitchFamily="34" charset="0"/>
+              <a:buChar char="•"/>
+            </a:pPr>
+            <a:r>
+              <a:rPr lang="en-US" dirty="0"/>
+              <a:t>Can the driver turn on lights for driving at night?</a:t>
+            </a:r>
+          </a:p>
+          <a:p>
+            <a:pPr marL="214313" indent="-214313">
+              <a:buFont typeface="Arial" panose="020B0604020202020204" pitchFamily="34" charset="0"/>
+              <a:buChar char="•"/>
+            </a:pPr>
+            <a:r>
+              <a:rPr lang="en-US" dirty="0"/>
+              <a:t>Can I lock and unlock the doors remotely?</a:t>
+            </a:r>
+          </a:p>
+          <a:p>
+            <a:pPr marL="214313" indent="-214313">
+              <a:buFont typeface="Arial" panose="020B0604020202020204" pitchFamily="34" charset="0"/>
+              <a:buChar char="•"/>
+            </a:pPr>
+            <a:r>
+              <a:rPr lang="en-US" dirty="0"/>
+              <a:t>Is the compression of each cylinder in spec?</a:t>
+            </a:r>
+          </a:p>
+        </p:txBody>
+      </p:sp>
+      <p:sp>
+        <p:nvSpPr>
+          <p:cNvPr id="11" name="TextBox 10">
+            <a:extLst>
+              <a:ext uri="{FF2B5EF4-FFF2-40B4-BE49-F238E27FC236}">
+                <a16:creationId xmlns:a16="http://schemas.microsoft.com/office/drawing/2014/main" id="{11B59B33-2138-4D18-A737-96C8EDAEEA3B}"/>
+              </a:ext>
+            </a:extLst>
+          </p:cNvPr>
+          <p:cNvSpPr txBox="1"/>
+          <p:nvPr/>
+        </p:nvSpPr>
+        <p:spPr>
+          <a:xfrm>
+            <a:off x="286167" y="4243707"/>
+            <a:ext cx="3929174" cy="1569660"/>
+          </a:xfrm>
+          <a:prstGeom prst="rect">
+            <a:avLst/>
+          </a:prstGeom>
+          <a:noFill/>
+        </p:spPr>
+        <p:txBody>
+          <a:bodyPr wrap="square" rtlCol="0">
+            <a:spAutoFit/>
+          </a:bodyPr>
+          <a:lstStyle/>
+          <a:p>
+            <a:r>
+              <a:rPr lang="en-US" sz="2100" dirty="0"/>
+              <a:t>Does design satisfy business need like:</a:t>
+            </a:r>
+          </a:p>
+          <a:p>
+            <a:pPr marL="214313" indent="-214313">
+              <a:buFont typeface="Arial" panose="020B0604020202020204" pitchFamily="34" charset="0"/>
+              <a:buChar char="•"/>
+            </a:pPr>
+            <a:r>
+              <a:rPr lang="en-US" dirty="0"/>
+              <a:t>Can it haul a 2600 </a:t>
+            </a:r>
+            <a:r>
+              <a:rPr lang="en-US" dirty="0" err="1"/>
+              <a:t>lb</a:t>
+            </a:r>
+            <a:r>
+              <a:rPr lang="en-US" dirty="0"/>
+              <a:t> Bobcat?</a:t>
+            </a:r>
+          </a:p>
+          <a:p>
+            <a:pPr marL="214313" indent="-214313">
+              <a:buFont typeface="Arial" panose="020B0604020202020204" pitchFamily="34" charset="0"/>
+              <a:buChar char="•"/>
+            </a:pPr>
+            <a:r>
+              <a:rPr lang="en-US" dirty="0"/>
+              <a:t>Is it easy to offload and load Bobcat at jobsite?</a:t>
+            </a:r>
+          </a:p>
+        </p:txBody>
+      </p:sp>
+      <p:pic>
+        <p:nvPicPr>
+          <p:cNvPr id="9" name="Picture 8" descr="A close up of a sign&#10;&#10;Description automatically generated">
+            <a:extLst>
+              <a:ext uri="{FF2B5EF4-FFF2-40B4-BE49-F238E27FC236}">
+                <a16:creationId xmlns:a16="http://schemas.microsoft.com/office/drawing/2014/main" id="{87751FD0-558B-4951-A52F-2DFB113A7BBF}"/>
+              </a:ext>
+            </a:extLst>
+          </p:cNvPr>
+          <p:cNvPicPr>
+            <a:picLocks noChangeAspect="1"/>
+          </p:cNvPicPr>
+          <p:nvPr/>
+        </p:nvPicPr>
+        <p:blipFill>
+          <a:blip r:embed="rId5" cstate="print">
+            <a:extLst>
+              <a:ext uri="{28A0092B-C50C-407E-A947-70E740481C1C}">
+                <a14:useLocalDpi xmlns:a14="http://schemas.microsoft.com/office/drawing/2010/main" val="0"/>
+              </a:ext>
+            </a:extLst>
+          </a:blip>
+          <a:stretch>
+            <a:fillRect/>
+          </a:stretch>
+        </p:blipFill>
+        <p:spPr>
+          <a:xfrm>
+            <a:off x="6100830" y="1625901"/>
+            <a:ext cx="507932" cy="507932"/>
+          </a:xfrm>
+          <a:prstGeom prst="rect">
+            <a:avLst/>
+          </a:prstGeom>
+        </p:spPr>
+      </p:pic>
+      <p:pic>
+        <p:nvPicPr>
+          <p:cNvPr id="14" name="Picture 13" descr="A close up of a sign&#10;&#10;Description automatically generated">
+            <a:extLst>
+              <a:ext uri="{FF2B5EF4-FFF2-40B4-BE49-F238E27FC236}">
+                <a16:creationId xmlns:a16="http://schemas.microsoft.com/office/drawing/2014/main" id="{39940456-261D-4EAC-A1C6-597C96FD2BBD}"/>
+              </a:ext>
+            </a:extLst>
+          </p:cNvPr>
+          <p:cNvPicPr>
+            <a:picLocks noChangeAspect="1"/>
+          </p:cNvPicPr>
+          <p:nvPr/>
+        </p:nvPicPr>
+        <p:blipFill>
+          <a:blip r:embed="rId5" cstate="print">
+            <a:extLst>
+              <a:ext uri="{28A0092B-C50C-407E-A947-70E740481C1C}">
+                <a14:useLocalDpi xmlns:a14="http://schemas.microsoft.com/office/drawing/2010/main" val="0"/>
+              </a:ext>
+            </a:extLst>
+          </a:blip>
+          <a:stretch>
+            <a:fillRect/>
+          </a:stretch>
+        </p:blipFill>
+        <p:spPr>
+          <a:xfrm>
+            <a:off x="6100830" y="3257188"/>
+            <a:ext cx="507932" cy="507932"/>
+          </a:xfrm>
+          <a:prstGeom prst="rect">
+            <a:avLst/>
+          </a:prstGeom>
+        </p:spPr>
+      </p:pic>
+      <p:pic>
+        <p:nvPicPr>
+          <p:cNvPr id="15" name="Picture 14" descr="A close up of a sign&#10;&#10;Description automatically generated">
+            <a:extLst>
+              <a:ext uri="{FF2B5EF4-FFF2-40B4-BE49-F238E27FC236}">
+                <a16:creationId xmlns:a16="http://schemas.microsoft.com/office/drawing/2014/main" id="{AE035D76-8520-4A5C-A0AE-1DB35318CEBD}"/>
+              </a:ext>
+            </a:extLst>
+          </p:cNvPr>
+          <p:cNvPicPr>
+            <a:picLocks noChangeAspect="1"/>
+          </p:cNvPicPr>
+          <p:nvPr/>
+        </p:nvPicPr>
+        <p:blipFill>
+          <a:blip r:embed="rId5" cstate="print">
+            <a:extLst>
+              <a:ext uri="{28A0092B-C50C-407E-A947-70E740481C1C}">
+                <a14:useLocalDpi xmlns:a14="http://schemas.microsoft.com/office/drawing/2010/main" val="0"/>
+              </a:ext>
+            </a:extLst>
+          </a:blip>
+          <a:stretch>
+            <a:fillRect/>
+          </a:stretch>
+        </p:blipFill>
+        <p:spPr>
+          <a:xfrm>
+            <a:off x="6100830" y="4749890"/>
+            <a:ext cx="507932" cy="507932"/>
+          </a:xfrm>
+          <a:prstGeom prst="rect">
+            <a:avLst/>
+          </a:prstGeom>
+        </p:spPr>
+      </p:pic>
+      <p:pic>
+        <p:nvPicPr>
+          <p:cNvPr id="17" name="Picture 16" descr="A picture containing clipart&#10;&#10;Description automatically generated">
+            <a:extLst>
+              <a:ext uri="{FF2B5EF4-FFF2-40B4-BE49-F238E27FC236}">
+                <a16:creationId xmlns:a16="http://schemas.microsoft.com/office/drawing/2014/main" id="{2B17EA60-04C5-4250-9CFA-C361BEEF1A7A}"/>
+              </a:ext>
+            </a:extLst>
+          </p:cNvPr>
+          <p:cNvPicPr>
+            <a:picLocks noChangeAspect="1"/>
+          </p:cNvPicPr>
+          <p:nvPr/>
+        </p:nvPicPr>
+        <p:blipFill>
+          <a:blip r:embed="rId6" cstate="print">
+            <a:extLst>
+              <a:ext uri="{28A0092B-C50C-407E-A947-70E740481C1C}">
+                <a14:useLocalDpi xmlns:a14="http://schemas.microsoft.com/office/drawing/2010/main" val="0"/>
+              </a:ext>
+            </a:extLst>
+          </a:blip>
+          <a:stretch>
+            <a:fillRect/>
+          </a:stretch>
+        </p:blipFill>
+        <p:spPr>
+          <a:xfrm>
+            <a:off x="6159856" y="2057400"/>
+            <a:ext cx="411352" cy="415058"/>
+          </a:xfrm>
+          <a:prstGeom prst="rect">
+            <a:avLst/>
+          </a:prstGeom>
+        </p:spPr>
+      </p:pic>
+      <p:pic>
+        <p:nvPicPr>
+          <p:cNvPr id="21" name="Picture 20" descr="A picture containing clipart&#10;&#10;Description automatically generated">
+            <a:extLst>
+              <a:ext uri="{FF2B5EF4-FFF2-40B4-BE49-F238E27FC236}">
+                <a16:creationId xmlns:a16="http://schemas.microsoft.com/office/drawing/2014/main" id="{882D2786-B985-4EA2-9D05-F2E591024423}"/>
+              </a:ext>
+            </a:extLst>
+          </p:cNvPr>
+          <p:cNvPicPr>
+            <a:picLocks noChangeAspect="1"/>
+          </p:cNvPicPr>
+          <p:nvPr/>
+        </p:nvPicPr>
+        <p:blipFill>
+          <a:blip r:embed="rId6" cstate="print">
+            <a:extLst>
+              <a:ext uri="{28A0092B-C50C-407E-A947-70E740481C1C}">
+                <a14:useLocalDpi xmlns:a14="http://schemas.microsoft.com/office/drawing/2010/main" val="0"/>
+              </a:ext>
+            </a:extLst>
+          </a:blip>
+          <a:stretch>
+            <a:fillRect/>
+          </a:stretch>
+        </p:blipFill>
+        <p:spPr>
+          <a:xfrm>
+            <a:off x="6163856" y="3704953"/>
+            <a:ext cx="411352" cy="415058"/>
+          </a:xfrm>
+          <a:prstGeom prst="rect">
+            <a:avLst/>
+          </a:prstGeom>
+        </p:spPr>
+      </p:pic>
+      <p:pic>
+        <p:nvPicPr>
+          <p:cNvPr id="22" name="Picture 21" descr="A close up of a sign&#10;&#10;Description automatically generated">
+            <a:extLst>
+              <a:ext uri="{FF2B5EF4-FFF2-40B4-BE49-F238E27FC236}">
+                <a16:creationId xmlns:a16="http://schemas.microsoft.com/office/drawing/2014/main" id="{35BE1897-97DF-457A-8FB0-2A692464CB4A}"/>
+              </a:ext>
+            </a:extLst>
+          </p:cNvPr>
+          <p:cNvPicPr>
+            <a:picLocks noChangeAspect="1"/>
+          </p:cNvPicPr>
+          <p:nvPr/>
+        </p:nvPicPr>
+        <p:blipFill>
+          <a:blip r:embed="rId5" cstate="print">
+            <a:extLst>
+              <a:ext uri="{28A0092B-C50C-407E-A947-70E740481C1C}">
+                <a14:useLocalDpi xmlns:a14="http://schemas.microsoft.com/office/drawing/2010/main" val="0"/>
+              </a:ext>
+            </a:extLst>
+          </a:blip>
+          <a:stretch>
+            <a:fillRect/>
+          </a:stretch>
+        </p:blipFill>
+        <p:spPr>
+          <a:xfrm>
+            <a:off x="6114006" y="5200650"/>
+            <a:ext cx="507932" cy="507932"/>
+          </a:xfrm>
+          <a:prstGeom prst="rect">
+            <a:avLst/>
+          </a:prstGeom>
+        </p:spPr>
+      </p:pic>
+      <p:pic>
+        <p:nvPicPr>
+          <p:cNvPr id="1026" name="Picture 2" descr="Image result for toyota april fool">
+            <a:extLst>
+              <a:ext uri="{FF2B5EF4-FFF2-40B4-BE49-F238E27FC236}">
+                <a16:creationId xmlns:a16="http://schemas.microsoft.com/office/drawing/2014/main" id="{D199EC51-111F-4003-9D03-A38CEFC3E6B1}"/>
+              </a:ext>
+            </a:extLst>
+          </p:cNvPr>
+          <p:cNvPicPr>
+            <a:picLocks noChangeAspect="1" noChangeArrowheads="1"/>
+          </p:cNvPicPr>
+          <p:nvPr/>
+        </p:nvPicPr>
+        <p:blipFill>
+          <a:blip r:embed="rId7">
+            <a:extLst>
+              <a:ext uri="{28A0092B-C50C-407E-A947-70E740481C1C}">
+                <a14:useLocalDpi xmlns:a14="http://schemas.microsoft.com/office/drawing/2010/main" val="0"/>
+              </a:ext>
+            </a:extLst>
+          </a:blip>
+          <a:srcRect/>
+          <a:stretch>
+            <a:fillRect/>
+          </a:stretch>
+        </p:blipFill>
+        <p:spPr bwMode="auto">
+          <a:xfrm>
+            <a:off x="6586639" y="1682354"/>
+            <a:ext cx="2571750" cy="1543050"/>
+          </a:xfrm>
+          <a:prstGeom prst="rect">
+            <a:avLst/>
+          </a:prstGeom>
+          <a:noFill/>
+          <a:extLst>
+            <a:ext uri="{909E8E84-426E-40DD-AFC4-6F175D3DCCD1}">
+              <a14:hiddenFill xmlns:a14="http://schemas.microsoft.com/office/drawing/2010/main">
+                <a:solidFill>
+                  <a:srgbClr val="FFFFFF"/>
+                </a:solidFill>
+              </a14:hiddenFill>
+            </a:ext>
+          </a:extLst>
+        </p:spPr>
+      </p:pic>
+    </p:spTree>
+    <p:extLst>
+      <p:ext uri="{BB962C8B-B14F-4D97-AF65-F5344CB8AC3E}">
+        <p14:creationId xmlns:p14="http://schemas.microsoft.com/office/powerpoint/2010/main" val="1938406011"/>
+      </p:ext>
+    </p:extLst>
+  </p:cSld>
+  <p:clrMapOvr>
+    <a:masterClrMapping/>
+  </p:clrMapOvr>
+  <p:timing>
+    <p:tnLst>
+      <p:par>
+        <p:cTn id="1" dur="indefinite" restart="never" nodeType="tmRoot">
+          <p:childTnLst>
+            <p:seq concurrent="1" nextAc="seek">
+              <p:cTn id="2" dur="indefinite" nodeType="mainSeq">
+                <p:childTnLst>
+                  <p:par>
+                    <p:cTn id="3" fill="hold">
+                      <p:stCondLst>
+                        <p:cond delay="indefinite"/>
+                      </p:stCondLst>
+                      <p:childTnLst>
+                        <p:par>
+                          <p:cTn id="4" fill="hold">
+                            <p:stCondLst>
+                              <p:cond delay="0"/>
+                            </p:stCondLst>
+                            <p:childTnLst>
+                              <p:par>
+                                <p:cTn id="5" presetID="1" presetClass="entr" presetSubtype="0" fill="hold" grpId="0" nodeType="clickEffect">
+                                  <p:stCondLst>
+                                    <p:cond delay="0"/>
+                                  </p:stCondLst>
+                                  <p:childTnLst>
+                                    <p:set>
+                                      <p:cBhvr>
+                                        <p:cTn id="6" dur="1" fill="hold">
+                                          <p:stCondLst>
+                                            <p:cond delay="0"/>
+                                          </p:stCondLst>
+                                        </p:cTn>
+                                        <p:tgtEl>
+                                          <p:spTgt spid="7"/>
+                                        </p:tgtEl>
+                                        <p:attrNameLst>
+                                          <p:attrName>style.visibility</p:attrName>
+                                        </p:attrNameLst>
+                                      </p:cBhvr>
+                                      <p:to>
+                                        <p:strVal val="visible"/>
+                                      </p:to>
+                                    </p:set>
+                                  </p:childTnLst>
+                                </p:cTn>
+                              </p:par>
+                              <p:par>
+                                <p:cTn id="7" presetID="1" presetClass="entr" presetSubtype="0" fill="hold" nodeType="withEffect">
+                                  <p:stCondLst>
+                                    <p:cond delay="0"/>
+                                  </p:stCondLst>
+                                  <p:childTnLst>
+                                    <p:set>
+                                      <p:cBhvr>
+                                        <p:cTn id="8" dur="1" fill="hold">
+                                          <p:stCondLst>
+                                            <p:cond delay="0"/>
+                                          </p:stCondLst>
+                                        </p:cTn>
+                                        <p:tgtEl>
+                                          <p:spTgt spid="9"/>
+                                        </p:tgtEl>
+                                        <p:attrNameLst>
+                                          <p:attrName>style.visibility</p:attrName>
+                                        </p:attrNameLst>
+                                      </p:cBhvr>
+                                      <p:to>
+                                        <p:strVal val="visible"/>
+                                      </p:to>
+                                    </p:set>
+                                  </p:childTnLst>
+                                </p:cTn>
+                              </p:par>
+                              <p:par>
+                                <p:cTn id="9" presetID="1" presetClass="entr" presetSubtype="0" fill="hold" nodeType="withEffect">
+                                  <p:stCondLst>
+                                    <p:cond delay="0"/>
+                                  </p:stCondLst>
+                                  <p:childTnLst>
+                                    <p:set>
+                                      <p:cBhvr>
+                                        <p:cTn id="10" dur="1" fill="hold">
+                                          <p:stCondLst>
+                                            <p:cond delay="0"/>
+                                          </p:stCondLst>
+                                        </p:cTn>
+                                        <p:tgtEl>
+                                          <p:spTgt spid="14"/>
+                                        </p:tgtEl>
+                                        <p:attrNameLst>
+                                          <p:attrName>style.visibility</p:attrName>
+                                        </p:attrNameLst>
+                                      </p:cBhvr>
+                                      <p:to>
+                                        <p:strVal val="visible"/>
+                                      </p:to>
+                                    </p:set>
+                                  </p:childTnLst>
+                                </p:cTn>
+                              </p:par>
+                              <p:par>
+                                <p:cTn id="11" presetID="1" presetClass="entr" presetSubtype="0" fill="hold" nodeType="withEffect">
+                                  <p:stCondLst>
+                                    <p:cond delay="0"/>
+                                  </p:stCondLst>
+                                  <p:childTnLst>
+                                    <p:set>
+                                      <p:cBhvr>
+                                        <p:cTn id="12" dur="1" fill="hold">
+                                          <p:stCondLst>
+                                            <p:cond delay="0"/>
+                                          </p:stCondLst>
+                                        </p:cTn>
+                                        <p:tgtEl>
+                                          <p:spTgt spid="15"/>
+                                        </p:tgtEl>
+                                        <p:attrNameLst>
+                                          <p:attrName>style.visibility</p:attrName>
+                                        </p:attrNameLst>
+                                      </p:cBhvr>
+                                      <p:to>
+                                        <p:strVal val="visible"/>
+                                      </p:to>
+                                    </p:set>
+                                  </p:childTnLst>
+                                </p:cTn>
+                              </p:par>
+                            </p:childTnLst>
+                          </p:cTn>
+                        </p:par>
+                      </p:childTnLst>
+                    </p:cTn>
+                  </p:par>
+                  <p:par>
+                    <p:cTn id="13" fill="hold">
+                      <p:stCondLst>
+                        <p:cond delay="indefinite"/>
+                      </p:stCondLst>
+                      <p:childTnLst>
+                        <p:par>
+                          <p:cTn id="14" fill="hold">
+                            <p:stCondLst>
+                              <p:cond delay="0"/>
+                            </p:stCondLst>
+                            <p:childTnLst>
+                              <p:par>
+                                <p:cTn id="15" presetID="1" presetClass="entr" presetSubtype="0" fill="hold" nodeType="clickEffect">
+                                  <p:stCondLst>
+                                    <p:cond delay="0"/>
+                                  </p:stCondLst>
+                                  <p:childTnLst>
+                                    <p:set>
+                                      <p:cBhvr>
+                                        <p:cTn id="16" dur="1" fill="hold">
+                                          <p:stCondLst>
+                                            <p:cond delay="0"/>
+                                          </p:stCondLst>
+                                        </p:cTn>
+                                        <p:tgtEl>
+                                          <p:spTgt spid="22"/>
+                                        </p:tgtEl>
+                                        <p:attrNameLst>
+                                          <p:attrName>style.visibility</p:attrName>
+                                        </p:attrNameLst>
+                                      </p:cBhvr>
+                                      <p:to>
+                                        <p:strVal val="visible"/>
+                                      </p:to>
+                                    </p:set>
+                                  </p:childTnLst>
+                                </p:cTn>
+                              </p:par>
+                              <p:par>
+                                <p:cTn id="17" presetID="1" presetClass="entr" presetSubtype="0" fill="hold" grpId="0" nodeType="withEffect">
+                                  <p:stCondLst>
+                                    <p:cond delay="0"/>
+                                  </p:stCondLst>
+                                  <p:childTnLst>
+                                    <p:set>
+                                      <p:cBhvr>
+                                        <p:cTn id="18" dur="1" fill="hold">
+                                          <p:stCondLst>
+                                            <p:cond delay="0"/>
+                                          </p:stCondLst>
+                                        </p:cTn>
+                                        <p:tgtEl>
+                                          <p:spTgt spid="11"/>
+                                        </p:tgtEl>
+                                        <p:attrNameLst>
+                                          <p:attrName>style.visibility</p:attrName>
+                                        </p:attrNameLst>
+                                      </p:cBhvr>
+                                      <p:to>
+                                        <p:strVal val="visible"/>
+                                      </p:to>
+                                    </p:set>
+                                  </p:childTnLst>
+                                </p:cTn>
+                              </p:par>
+                              <p:par>
+                                <p:cTn id="19" presetID="1" presetClass="entr" presetSubtype="0" fill="hold" nodeType="withEffect">
+                                  <p:stCondLst>
+                                    <p:cond delay="0"/>
+                                  </p:stCondLst>
+                                  <p:childTnLst>
+                                    <p:set>
+                                      <p:cBhvr>
+                                        <p:cTn id="20" dur="1" fill="hold">
+                                          <p:stCondLst>
+                                            <p:cond delay="0"/>
+                                          </p:stCondLst>
+                                        </p:cTn>
+                                        <p:tgtEl>
+                                          <p:spTgt spid="17"/>
+                                        </p:tgtEl>
+                                        <p:attrNameLst>
+                                          <p:attrName>style.visibility</p:attrName>
+                                        </p:attrNameLst>
+                                      </p:cBhvr>
+                                      <p:to>
+                                        <p:strVal val="visible"/>
+                                      </p:to>
+                                    </p:set>
+                                  </p:childTnLst>
+                                </p:cTn>
+                              </p:par>
+                              <p:par>
+                                <p:cTn id="21" presetID="1" presetClass="entr" presetSubtype="0" fill="hold" nodeType="withEffect">
+                                  <p:stCondLst>
+                                    <p:cond delay="0"/>
+                                  </p:stCondLst>
+                                  <p:childTnLst>
+                                    <p:set>
+                                      <p:cBhvr>
+                                        <p:cTn id="22" dur="1" fill="hold">
+                                          <p:stCondLst>
+                                            <p:cond delay="0"/>
+                                          </p:stCondLst>
+                                        </p:cTn>
+                                        <p:tgtEl>
+                                          <p:spTgt spid="21"/>
+                                        </p:tgtEl>
+                                        <p:attrNameLst>
+                                          <p:attrName>style.visibility</p:attrName>
+                                        </p:attrNameLst>
+                                      </p:cBhvr>
+                                      <p:to>
+                                        <p:strVal val="visible"/>
+                                      </p:to>
+                                    </p:set>
+                                  </p:childTnLst>
+                                </p:cTn>
+                              </p:par>
+                            </p:childTnLst>
+                          </p:cTn>
+                        </p:par>
+                      </p:childTnLst>
+                    </p:cTn>
+                  </p:par>
+                </p:childTnLst>
+              </p:cTn>
+              <p:prevCondLst>
+                <p:cond evt="onPrev" delay="0">
+                  <p:tgtEl>
+                    <p:sldTgt/>
+                  </p:tgtEl>
+                </p:cond>
+              </p:prevCondLst>
+              <p:nextCondLst>
+                <p:cond evt="onNext" delay="0">
+                  <p:tgtEl>
+                    <p:sldTgt/>
+                  </p:tgtEl>
+                </p:cond>
+              </p:nextCondLst>
+            </p:seq>
+          </p:childTnLst>
+        </p:cTn>
+      </p:par>
+    </p:tnLst>
+    <p:bldLst>
+      <p:bldP spid="7" grpId="0"/>
+      <p:bldP spid="11" grpId="0"/>
+    </p:bldLst>
+  </p:timing>
+</p:sld>
+</file>
+
+<file path=ppt/slides/slide21.xml><?xml version="1.0" encoding="utf-8"?>
+<p:sld xmlns:a="http://schemas.openxmlformats.org/drawingml/2006/main" xmlns:r="http://schemas.openxmlformats.org/officeDocument/2006/relationships" xmlns:p="http://schemas.openxmlformats.org/presentationml/2006/main">
+  <p:cSld>
+    <p:spTree>
+      <p:nvGrpSpPr>
+        <p:cNvPr id="1" name=""/>
+        <p:cNvGrpSpPr/>
+        <p:nvPr/>
+      </p:nvGrpSpPr>
+      <p:grpSpPr>
+        <a:xfrm>
+          <a:off x="0" y="0"/>
+          <a:ext cx="0" cy="0"/>
+          <a:chOff x="0" y="0"/>
+          <a:chExt cx="0" cy="0"/>
+        </a:xfrm>
+      </p:grpSpPr>
+      <p:sp>
+        <p:nvSpPr>
           <p:cNvPr id="2" name="Title 1"/>
           <p:cNvSpPr>
             <a:spLocks noGrp="1"/>
@@ -16889,7 +17852,7 @@
 </p:sld>
 </file>
 
-<file path=ppt/slides/slide21.xml><?xml version="1.0" encoding="utf-8"?>
+<file path=ppt/slides/slide22.xml><?xml version="1.0" encoding="utf-8"?>
 <p:sld xmlns:a="http://schemas.openxmlformats.org/drawingml/2006/main" xmlns:r="http://schemas.openxmlformats.org/officeDocument/2006/relationships" xmlns:p="http://schemas.openxmlformats.org/presentationml/2006/main">
   <p:cSld>
     <p:spTree>
@@ -17830,7 +18793,7 @@
 </p:sld>
 </file>
 
-<file path=ppt/slides/slide22.xml><?xml version="1.0" encoding="utf-8"?>
+<file path=ppt/slides/slide23.xml><?xml version="1.0" encoding="utf-8"?>
 <p:sld xmlns:a="http://schemas.openxmlformats.org/drawingml/2006/main" xmlns:r="http://schemas.openxmlformats.org/officeDocument/2006/relationships" xmlns:p="http://schemas.openxmlformats.org/presentationml/2006/main">
   <p:cSld>
     <p:spTree>
@@ -18332,7 +19295,7 @@
 </p:sld>
 </file>
 
-<file path=ppt/slides/slide23.xml><?xml version="1.0" encoding="utf-8"?>
+<file path=ppt/slides/slide24.xml><?xml version="1.0" encoding="utf-8"?>
 <p:sld xmlns:a="http://schemas.openxmlformats.org/drawingml/2006/main" xmlns:r="http://schemas.openxmlformats.org/officeDocument/2006/relationships" xmlns:p="http://schemas.openxmlformats.org/presentationml/2006/main">
   <p:cSld>
     <p:spTree>
@@ -21046,7 +22009,7 @@
 </p:sld>
 </file>
 
-<file path=ppt/slides/slide24.xml><?xml version="1.0" encoding="utf-8"?>
+<file path=ppt/slides/slide25.xml><?xml version="1.0" encoding="utf-8"?>
 <p:sld xmlns:a="http://schemas.openxmlformats.org/drawingml/2006/main" xmlns:r="http://schemas.openxmlformats.org/officeDocument/2006/relationships" xmlns:p="http://schemas.openxmlformats.org/presentationml/2006/main">
   <p:cSld>
     <p:spTree>
@@ -23928,7 +24891,7 @@
 </p:sld>
 </file>
 
-<file path=ppt/slides/slide25.xml><?xml version="1.0" encoding="utf-8"?>
+<file path=ppt/slides/slide26.xml><?xml version="1.0" encoding="utf-8"?>
 <p:sld xmlns:a="http://schemas.openxmlformats.org/drawingml/2006/main" xmlns:r="http://schemas.openxmlformats.org/officeDocument/2006/relationships" xmlns:p="http://schemas.openxmlformats.org/presentationml/2006/main">
   <p:cSld>
     <p:spTree>
@@ -27060,7 +28023,7 @@
 </p:sld>
 </file>
 
-<file path=ppt/slides/slide26.xml><?xml version="1.0" encoding="utf-8"?>
+<file path=ppt/slides/slide27.xml><?xml version="1.0" encoding="utf-8"?>
 <p:sld xmlns:a="http://schemas.openxmlformats.org/drawingml/2006/main" xmlns:r="http://schemas.openxmlformats.org/officeDocument/2006/relationships" xmlns:p="http://schemas.openxmlformats.org/presentationml/2006/main">
   <p:cSld>
     <p:spTree>
@@ -29848,7 +30811,7 @@
 </p:sld>
 </file>
 
-<file path=ppt/slides/slide27.xml><?xml version="1.0" encoding="utf-8"?>
+<file path=ppt/slides/slide28.xml><?xml version="1.0" encoding="utf-8"?>
 <p:sld xmlns:a="http://schemas.openxmlformats.org/drawingml/2006/main" xmlns:r="http://schemas.openxmlformats.org/officeDocument/2006/relationships" xmlns:p="http://schemas.openxmlformats.org/presentationml/2006/main">
   <p:cSld>
     <p:spTree>
@@ -32967,7 +33930,7 @@
 </p:sld>
 </file>
 
-<file path=ppt/slides/slide28.xml><?xml version="1.0" encoding="utf-8"?>
+<file path=ppt/slides/slide29.xml><?xml version="1.0" encoding="utf-8"?>
 <p:sld xmlns:a="http://schemas.openxmlformats.org/drawingml/2006/main" xmlns:r="http://schemas.openxmlformats.org/officeDocument/2006/relationships" xmlns:p="http://schemas.openxmlformats.org/presentationml/2006/main">
   <p:cSld>
     <p:spTree>
@@ -33073,7 +34036,201 @@
 </p:sld>
 </file>
 
-<file path=ppt/slides/slide29.xml><?xml version="1.0" encoding="utf-8"?>
+<file path=ppt/slides/slide3.xml><?xml version="1.0" encoding="utf-8"?>
+<p:sld xmlns:a="http://schemas.openxmlformats.org/drawingml/2006/main" xmlns:r="http://schemas.openxmlformats.org/officeDocument/2006/relationships" xmlns:p="http://schemas.openxmlformats.org/presentationml/2006/main">
+  <p:cSld>
+    <p:spTree>
+      <p:nvGrpSpPr>
+        <p:cNvPr id="1" name=""/>
+        <p:cNvGrpSpPr/>
+        <p:nvPr/>
+      </p:nvGrpSpPr>
+      <p:grpSpPr>
+        <a:xfrm>
+          <a:off x="0" y="0"/>
+          <a:ext cx="0" cy="0"/>
+          <a:chOff x="0" y="0"/>
+          <a:chExt cx="0" cy="0"/>
+        </a:xfrm>
+      </p:grpSpPr>
+      <p:sp>
+        <p:nvSpPr>
+          <p:cNvPr id="2" name="Title 1"/>
+          <p:cNvSpPr>
+            <a:spLocks noGrp="1"/>
+          </p:cNvSpPr>
+          <p:nvPr>
+            <p:ph type="title"/>
+          </p:nvPr>
+        </p:nvSpPr>
+        <p:spPr/>
+        <p:txBody>
+          <a:bodyPr/>
+          <a:lstStyle/>
+          <a:p>
+            <a:r>
+              <a:rPr lang="en-US" dirty="0"/>
+              <a:t>Importance for Leaders</a:t>
+            </a:r>
+          </a:p>
+        </p:txBody>
+      </p:sp>
+      <p:sp>
+        <p:nvSpPr>
+          <p:cNvPr id="3" name="Footer Placeholder 2"/>
+          <p:cNvSpPr>
+            <a:spLocks noGrp="1"/>
+          </p:cNvSpPr>
+          <p:nvPr>
+            <p:ph type="ftr" sz="quarter" idx="10"/>
+          </p:nvPr>
+        </p:nvSpPr>
+        <p:spPr/>
+        <p:txBody>
+          <a:bodyPr/>
+          <a:lstStyle/>
+          <a:p>
+            <a:pPr algn="ctr">
+              <a:defRPr/>
+            </a:pPr>
+            <a:r>
+              <a:rPr lang="en-US" altLang="en-US" dirty="0"/>
+              <a:t>©2013-2019 Octopus Software LLC</a:t>
+            </a:r>
+          </a:p>
+        </p:txBody>
+      </p:sp>
+      <p:sp>
+        <p:nvSpPr>
+          <p:cNvPr id="5" name="TextBox 4"/>
+          <p:cNvSpPr txBox="1"/>
+          <p:nvPr/>
+        </p:nvSpPr>
+        <p:spPr>
+          <a:xfrm>
+            <a:off x="179512" y="1168788"/>
+            <a:ext cx="8856984" cy="3477875"/>
+          </a:xfrm>
+          <a:prstGeom prst="rect">
+            <a:avLst/>
+          </a:prstGeom>
+          <a:noFill/>
+        </p:spPr>
+        <p:txBody>
+          <a:bodyPr wrap="square" rtlCol="0">
+            <a:spAutoFit/>
+          </a:bodyPr>
+          <a:lstStyle/>
+          <a:p>
+            <a:r>
+              <a:rPr lang="en-US" sz="2000" dirty="0"/>
+              <a:t>As a coach and leader, how can you </a:t>
+            </a:r>
+            <a:r>
+              <a:rPr lang="en-US" sz="2000" b="1" dirty="0"/>
+              <a:t>help </a:t>
+            </a:r>
+            <a:r>
+              <a:rPr lang="en-US" sz="2000" dirty="0"/>
+              <a:t>them if you don’t understand the impact of the:</a:t>
+            </a:r>
+          </a:p>
+          <a:p>
+            <a:pPr marL="285750" indent="-285750">
+              <a:buFont typeface="Arial" panose="020B0604020202020204" pitchFamily="34" charset="0"/>
+              <a:buChar char="•"/>
+            </a:pPr>
+            <a:r>
+              <a:rPr lang="en-US" sz="2000" dirty="0"/>
+              <a:t>Approach</a:t>
+            </a:r>
+          </a:p>
+          <a:p>
+            <a:pPr marL="285750" indent="-285750">
+              <a:buFont typeface="Arial" panose="020B0604020202020204" pitchFamily="34" charset="0"/>
+              <a:buChar char="•"/>
+            </a:pPr>
+            <a:r>
+              <a:rPr lang="en-US" sz="2000" dirty="0"/>
+              <a:t>Impact on daily work</a:t>
+            </a:r>
+          </a:p>
+          <a:p>
+            <a:pPr marL="742950" lvl="1" indent="-285750">
+              <a:buFont typeface="Arial" panose="020B0604020202020204" pitchFamily="34" charset="0"/>
+              <a:buChar char="•"/>
+            </a:pPr>
+            <a:r>
+              <a:rPr lang="en-US" sz="2000" dirty="0"/>
+              <a:t>Especially the implication on the ingrained habits the team members currently have</a:t>
+            </a:r>
+          </a:p>
+          <a:p>
+            <a:pPr marL="742950" lvl="1" indent="-285750">
+              <a:buFont typeface="Arial" panose="020B0604020202020204" pitchFamily="34" charset="0"/>
+              <a:buChar char="•"/>
+            </a:pPr>
+            <a:r>
+              <a:rPr lang="en-US" sz="2000" dirty="0"/>
+              <a:t>Collaboration and work allocation</a:t>
+            </a:r>
+          </a:p>
+          <a:p>
+            <a:pPr marL="742950" lvl="1" indent="-285750">
+              <a:buFont typeface="Arial" panose="020B0604020202020204" pitchFamily="34" charset="0"/>
+              <a:buChar char="•"/>
+            </a:pPr>
+            <a:r>
+              <a:rPr lang="en-US" sz="2000" dirty="0"/>
+              <a:t>Inputs and outputs</a:t>
+            </a:r>
+          </a:p>
+          <a:p>
+            <a:pPr marL="342900" indent="-342900">
+              <a:buFont typeface="Arial" panose="020B0604020202020204" pitchFamily="34" charset="0"/>
+              <a:buChar char="•"/>
+            </a:pPr>
+            <a:r>
+              <a:rPr lang="en-US" sz="2000" dirty="0"/>
+              <a:t>Impact on processes and tooling</a:t>
+            </a:r>
+          </a:p>
+          <a:p>
+            <a:pPr marL="342900" indent="-342900">
+              <a:buFont typeface="Arial" panose="020B0604020202020204" pitchFamily="34" charset="0"/>
+              <a:buChar char="•"/>
+            </a:pPr>
+            <a:r>
+              <a:rPr lang="en-US" sz="2000" dirty="0"/>
+              <a:t>Training and support needed</a:t>
+            </a:r>
+          </a:p>
+          <a:p>
+            <a:pPr marL="342900" indent="-342900">
+              <a:buFont typeface="Arial" panose="020B0604020202020204" pitchFamily="34" charset="0"/>
+              <a:buChar char="•"/>
+            </a:pPr>
+            <a:r>
+              <a:rPr lang="en-US" sz="2000" dirty="0"/>
+              <a:t>Costs and benefits</a:t>
+            </a:r>
+          </a:p>
+        </p:txBody>
+      </p:sp>
+    </p:spTree>
+    <p:extLst>
+      <p:ext uri="{BB962C8B-B14F-4D97-AF65-F5344CB8AC3E}">
+        <p14:creationId xmlns:p14="http://schemas.microsoft.com/office/powerpoint/2010/main" val="2108363777"/>
+      </p:ext>
+    </p:extLst>
+  </p:cSld>
+  <p:clrMapOvr>
+    <a:masterClrMapping/>
+  </p:clrMapOvr>
+</p:sld>
+</file>
+
+<file path=ppt/slides/slide30.xml><?xml version="1.0" encoding="utf-8"?>
 <p:sld xmlns:a="http://schemas.openxmlformats.org/drawingml/2006/main" xmlns:r="http://schemas.openxmlformats.org/officeDocument/2006/relationships" xmlns:p="http://schemas.openxmlformats.org/presentationml/2006/main">
   <p:cSld>
     <p:spTree>
@@ -33150,200 +34307,6 @@
     <p:extLst>
       <p:ext uri="{BB962C8B-B14F-4D97-AF65-F5344CB8AC3E}">
         <p14:creationId xmlns:p14="http://schemas.microsoft.com/office/powerpoint/2010/main" val="2672704414"/>
-      </p:ext>
-    </p:extLst>
-  </p:cSld>
-  <p:clrMapOvr>
-    <a:masterClrMapping/>
-  </p:clrMapOvr>
-</p:sld>
-</file>
-
-<file path=ppt/slides/slide3.xml><?xml version="1.0" encoding="utf-8"?>
-<p:sld xmlns:a="http://schemas.openxmlformats.org/drawingml/2006/main" xmlns:r="http://schemas.openxmlformats.org/officeDocument/2006/relationships" xmlns:p="http://schemas.openxmlformats.org/presentationml/2006/main">
-  <p:cSld>
-    <p:spTree>
-      <p:nvGrpSpPr>
-        <p:cNvPr id="1" name=""/>
-        <p:cNvGrpSpPr/>
-        <p:nvPr/>
-      </p:nvGrpSpPr>
-      <p:grpSpPr>
-        <a:xfrm>
-          <a:off x="0" y="0"/>
-          <a:ext cx="0" cy="0"/>
-          <a:chOff x="0" y="0"/>
-          <a:chExt cx="0" cy="0"/>
-        </a:xfrm>
-      </p:grpSpPr>
-      <p:sp>
-        <p:nvSpPr>
-          <p:cNvPr id="2" name="Title 1"/>
-          <p:cNvSpPr>
-            <a:spLocks noGrp="1"/>
-          </p:cNvSpPr>
-          <p:nvPr>
-            <p:ph type="title"/>
-          </p:nvPr>
-        </p:nvSpPr>
-        <p:spPr/>
-        <p:txBody>
-          <a:bodyPr/>
-          <a:lstStyle/>
-          <a:p>
-            <a:r>
-              <a:rPr lang="en-US" dirty="0"/>
-              <a:t>Importance for Leaders</a:t>
-            </a:r>
-          </a:p>
-        </p:txBody>
-      </p:sp>
-      <p:sp>
-        <p:nvSpPr>
-          <p:cNvPr id="3" name="Footer Placeholder 2"/>
-          <p:cNvSpPr>
-            <a:spLocks noGrp="1"/>
-          </p:cNvSpPr>
-          <p:nvPr>
-            <p:ph type="ftr" sz="quarter" idx="10"/>
-          </p:nvPr>
-        </p:nvSpPr>
-        <p:spPr/>
-        <p:txBody>
-          <a:bodyPr/>
-          <a:lstStyle/>
-          <a:p>
-            <a:pPr algn="ctr">
-              <a:defRPr/>
-            </a:pPr>
-            <a:r>
-              <a:rPr lang="en-US" altLang="en-US" dirty="0"/>
-              <a:t>©2013-2019 Octopus Software LLC</a:t>
-            </a:r>
-          </a:p>
-        </p:txBody>
-      </p:sp>
-      <p:sp>
-        <p:nvSpPr>
-          <p:cNvPr id="5" name="TextBox 4"/>
-          <p:cNvSpPr txBox="1"/>
-          <p:nvPr/>
-        </p:nvSpPr>
-        <p:spPr>
-          <a:xfrm>
-            <a:off x="179512" y="1168788"/>
-            <a:ext cx="8856984" cy="3477875"/>
-          </a:xfrm>
-          <a:prstGeom prst="rect">
-            <a:avLst/>
-          </a:prstGeom>
-          <a:noFill/>
-        </p:spPr>
-        <p:txBody>
-          <a:bodyPr wrap="square" rtlCol="0">
-            <a:spAutoFit/>
-          </a:bodyPr>
-          <a:lstStyle/>
-          <a:p>
-            <a:r>
-              <a:rPr lang="en-US" sz="2000" dirty="0"/>
-              <a:t>As a coach and leader, how can you </a:t>
-            </a:r>
-            <a:r>
-              <a:rPr lang="en-US" sz="2000" b="1" dirty="0"/>
-              <a:t>help </a:t>
-            </a:r>
-            <a:r>
-              <a:rPr lang="en-US" sz="2000" dirty="0"/>
-              <a:t>them if you don’t understand the impact of the:</a:t>
-            </a:r>
-          </a:p>
-          <a:p>
-            <a:pPr marL="285750" indent="-285750">
-              <a:buFont typeface="Arial" panose="020B0604020202020204" pitchFamily="34" charset="0"/>
-              <a:buChar char="•"/>
-            </a:pPr>
-            <a:r>
-              <a:rPr lang="en-US" sz="2000" dirty="0"/>
-              <a:t>Approach</a:t>
-            </a:r>
-          </a:p>
-          <a:p>
-            <a:pPr marL="285750" indent="-285750">
-              <a:buFont typeface="Arial" panose="020B0604020202020204" pitchFamily="34" charset="0"/>
-              <a:buChar char="•"/>
-            </a:pPr>
-            <a:r>
-              <a:rPr lang="en-US" sz="2000" dirty="0"/>
-              <a:t>Impact on daily work</a:t>
-            </a:r>
-          </a:p>
-          <a:p>
-            <a:pPr marL="742950" lvl="1" indent="-285750">
-              <a:buFont typeface="Arial" panose="020B0604020202020204" pitchFamily="34" charset="0"/>
-              <a:buChar char="•"/>
-            </a:pPr>
-            <a:r>
-              <a:rPr lang="en-US" sz="2000" dirty="0"/>
-              <a:t>Especially the implication on the ingrained habits the team members currently have</a:t>
-            </a:r>
-          </a:p>
-          <a:p>
-            <a:pPr marL="742950" lvl="1" indent="-285750">
-              <a:buFont typeface="Arial" panose="020B0604020202020204" pitchFamily="34" charset="0"/>
-              <a:buChar char="•"/>
-            </a:pPr>
-            <a:r>
-              <a:rPr lang="en-US" sz="2000" dirty="0"/>
-              <a:t>Collaboration and work allocation</a:t>
-            </a:r>
-          </a:p>
-          <a:p>
-            <a:pPr marL="742950" lvl="1" indent="-285750">
-              <a:buFont typeface="Arial" panose="020B0604020202020204" pitchFamily="34" charset="0"/>
-              <a:buChar char="•"/>
-            </a:pPr>
-            <a:r>
-              <a:rPr lang="en-US" sz="2000" dirty="0"/>
-              <a:t>Inputs and outputs</a:t>
-            </a:r>
-          </a:p>
-          <a:p>
-            <a:pPr marL="342900" indent="-342900">
-              <a:buFont typeface="Arial" panose="020B0604020202020204" pitchFamily="34" charset="0"/>
-              <a:buChar char="•"/>
-            </a:pPr>
-            <a:r>
-              <a:rPr lang="en-US" sz="2000" dirty="0"/>
-              <a:t>Impact on processes and tooling</a:t>
-            </a:r>
-          </a:p>
-          <a:p>
-            <a:pPr marL="342900" indent="-342900">
-              <a:buFont typeface="Arial" panose="020B0604020202020204" pitchFamily="34" charset="0"/>
-              <a:buChar char="•"/>
-            </a:pPr>
-            <a:r>
-              <a:rPr lang="en-US" sz="2000" dirty="0"/>
-              <a:t>Training and support needed</a:t>
-            </a:r>
-          </a:p>
-          <a:p>
-            <a:pPr marL="342900" indent="-342900">
-              <a:buFont typeface="Arial" panose="020B0604020202020204" pitchFamily="34" charset="0"/>
-              <a:buChar char="•"/>
-            </a:pPr>
-            <a:r>
-              <a:rPr lang="en-US" sz="2000" dirty="0"/>
-              <a:t>Costs and benefits</a:t>
-            </a:r>
-          </a:p>
-        </p:txBody>
-      </p:sp>
-    </p:spTree>
-    <p:extLst>
-      <p:ext uri="{BB962C8B-B14F-4D97-AF65-F5344CB8AC3E}">
-        <p14:creationId xmlns:p14="http://schemas.microsoft.com/office/powerpoint/2010/main" val="2108363777"/>
       </p:ext>
     </p:extLst>
   </p:cSld>

</xml_diff>